<commit_message>
reduced text and added icons #1
</commit_message>
<xml_diff>
--- a/Project Scope/TradeSpace- Project scope.pptx
+++ b/Project Scope/TradeSpace- Project scope.pptx
@@ -5,17 +5,19 @@
     <p:sldMasterId id="2147483696" r:id="rId1"/>
   </p:sldMasterIdLst>
   <p:notesMasterIdLst>
-    <p:notesMasterId r:id="rId7"/>
+    <p:notesMasterId r:id="rId9"/>
   </p:notesMasterIdLst>
   <p:handoutMasterIdLst>
-    <p:handoutMasterId r:id="rId8"/>
+    <p:handoutMasterId r:id="rId10"/>
   </p:handoutMasterIdLst>
   <p:sldIdLst>
     <p:sldId id="256" r:id="rId2"/>
     <p:sldId id="257" r:id="rId3"/>
-    <p:sldId id="259" r:id="rId4"/>
-    <p:sldId id="260" r:id="rId5"/>
-    <p:sldId id="261" r:id="rId6"/>
+    <p:sldId id="262" r:id="rId4"/>
+    <p:sldId id="263" r:id="rId5"/>
+    <p:sldId id="264" r:id="rId6"/>
+    <p:sldId id="265" r:id="rId7"/>
+    <p:sldId id="261" r:id="rId8"/>
   </p:sldIdLst>
   <p:sldSz cx="12192000" cy="6858000"/>
   <p:notesSz cx="6858000" cy="9144000"/>
@@ -114,6 +116,14 @@
       </a:defRPr>
     </a:lvl9pPr>
   </p:defaultTextStyle>
+  <p:extLst>
+    <p:ext uri="{EFAFB233-063F-42B5-8137-9DF3F51BA10A}">
+      <p15:sldGuideLst xmlns:p15="http://schemas.microsoft.com/office/powerpoint/2012/main"/>
+    </p:ext>
+    <p:ext uri="{2D200454-40CA-4A62-9FC3-DE9A4176ACB9}">
+      <p15:notesGuideLst xmlns:p15="http://schemas.microsoft.com/office/powerpoint/2012/main"/>
+    </p:ext>
+  </p:extLst>
 </p:presentation>
 </file>
 
@@ -211,7 +221,7 @@
           <a:p>
             <a:fld id="{F44CC304-87BF-44E6-9764-D21BAF4E109B}" type="datetimeFigureOut">
               <a:rPr lang="en-US" smtClean="0"/>
-              <a:t>6/9/2023</a:t>
+              <a:t>6/10/2023</a:t>
             </a:fld>
             <a:endParaRPr lang="en-US"/>
           </a:p>
@@ -388,7 +398,7 @@
           <a:p>
             <a:fld id="{A169D797-6A7C-4D8A-A6BB-CF3C7F797395}" type="datetimeFigureOut">
               <a:rPr lang="en-US" smtClean="0"/>
-              <a:t>6/9/2023</a:t>
+              <a:t>6/10/2023</a:t>
             </a:fld>
             <a:endParaRPr lang="en-US"/>
           </a:p>
@@ -823,7 +833,7 @@
           <a:p>
             <a:fld id="{FA7EEA11-62A9-4BA6-B629-2D7D1830236F}" type="datetimeFigureOut">
               <a:rPr lang="en-US" smtClean="0"/>
-              <a:t>6/9/2023</a:t>
+              <a:t>6/10/2023</a:t>
             </a:fld>
             <a:endParaRPr lang="en-US"/>
           </a:p>
@@ -1051,7 +1061,7 @@
           <a:p>
             <a:fld id="{FA7EEA11-62A9-4BA6-B629-2D7D1830236F}" type="datetimeFigureOut">
               <a:rPr lang="en-US" smtClean="0"/>
-              <a:t>6/9/2023</a:t>
+              <a:t>6/10/2023</a:t>
             </a:fld>
             <a:endParaRPr lang="en-US"/>
           </a:p>
@@ -1231,7 +1241,7 @@
           <a:p>
             <a:fld id="{FA7EEA11-62A9-4BA6-B629-2D7D1830236F}" type="datetimeFigureOut">
               <a:rPr lang="en-US" smtClean="0"/>
-              <a:t>6/9/2023</a:t>
+              <a:t>6/10/2023</a:t>
             </a:fld>
             <a:endParaRPr lang="en-US"/>
           </a:p>
@@ -1401,7 +1411,7 @@
           <a:p>
             <a:fld id="{FA7EEA11-62A9-4BA6-B629-2D7D1830236F}" type="datetimeFigureOut">
               <a:rPr lang="en-US" smtClean="0"/>
-              <a:t>6/9/2023</a:t>
+              <a:t>6/10/2023</a:t>
             </a:fld>
             <a:endParaRPr lang="en-US"/>
           </a:p>
@@ -1655,7 +1665,7 @@
           <a:p>
             <a:fld id="{FA7EEA11-62A9-4BA6-B629-2D7D1830236F}" type="datetimeFigureOut">
               <a:rPr lang="en-US" smtClean="0"/>
-              <a:t>6/9/2023</a:t>
+              <a:t>6/10/2023</a:t>
             </a:fld>
             <a:endParaRPr lang="en-US"/>
           </a:p>
@@ -1981,7 +1991,7 @@
           <a:p>
             <a:fld id="{FA7EEA11-62A9-4BA6-B629-2D7D1830236F}" type="datetimeFigureOut">
               <a:rPr lang="en-US" smtClean="0"/>
-              <a:t>6/9/2023</a:t>
+              <a:t>6/10/2023</a:t>
             </a:fld>
             <a:endParaRPr lang="en-US"/>
           </a:p>
@@ -2432,7 +2442,7 @@
           <a:p>
             <a:fld id="{FA7EEA11-62A9-4BA6-B629-2D7D1830236F}" type="datetimeFigureOut">
               <a:rPr lang="en-US" smtClean="0"/>
-              <a:t>6/9/2023</a:t>
+              <a:t>6/10/2023</a:t>
             </a:fld>
             <a:endParaRPr lang="en-US"/>
           </a:p>
@@ -2550,7 +2560,7 @@
           <a:p>
             <a:fld id="{FA7EEA11-62A9-4BA6-B629-2D7D1830236F}" type="datetimeFigureOut">
               <a:rPr lang="en-US" smtClean="0"/>
-              <a:t>6/9/2023</a:t>
+              <a:t>6/10/2023</a:t>
             </a:fld>
             <a:endParaRPr lang="en-US"/>
           </a:p>
@@ -2645,7 +2655,7 @@
           <a:p>
             <a:fld id="{FA7EEA11-62A9-4BA6-B629-2D7D1830236F}" type="datetimeFigureOut">
               <a:rPr lang="en-US" smtClean="0"/>
-              <a:t>6/9/2023</a:t>
+              <a:t>6/10/2023</a:t>
             </a:fld>
             <a:endParaRPr lang="en-US"/>
           </a:p>
@@ -2932,7 +2942,7 @@
           <a:p>
             <a:fld id="{FA7EEA11-62A9-4BA6-B629-2D7D1830236F}" type="datetimeFigureOut">
               <a:rPr lang="en-US" smtClean="0"/>
-              <a:t>6/9/2023</a:t>
+              <a:t>6/10/2023</a:t>
             </a:fld>
             <a:endParaRPr lang="en-US"/>
           </a:p>
@@ -3254,7 +3264,7 @@
           <a:p>
             <a:fld id="{FA7EEA11-62A9-4BA6-B629-2D7D1830236F}" type="datetimeFigureOut">
               <a:rPr lang="en-US" smtClean="0"/>
-              <a:t>6/9/2023</a:t>
+              <a:t>6/10/2023</a:t>
             </a:fld>
             <a:endParaRPr lang="en-US"/>
           </a:p>
@@ -3508,7 +3518,7 @@
           <a:p>
             <a:fld id="{FA7EEA11-62A9-4BA6-B629-2D7D1830236F}" type="datetimeFigureOut">
               <a:rPr lang="en-US" smtClean="0"/>
-              <a:t>6/9/2023</a:t>
+              <a:t>6/10/2023</a:t>
             </a:fld>
             <a:endParaRPr lang="en-US"/>
           </a:p>
@@ -4432,18 +4442,126 @@
           <a:lstStyle/>
           <a:p>
             <a:r>
-              <a:rPr lang="en-US" sz="6600" b="1" dirty="0"/>
-              <a:t>Major Features</a:t>
-            </a:r>
-          </a:p>
-        </p:txBody>
-      </p:sp>
-      <p:sp>
-        <p:nvSpPr>
-          <p:cNvPr id="7" name="Rectangle 6">
+              <a:rPr lang="en-US" sz="4800" b="1" dirty="0"/>
+              <a:t>Search and Filter</a:t>
+            </a:r>
+          </a:p>
+        </p:txBody>
+      </p:sp>
+      <p:pic>
+        <p:nvPicPr>
+          <p:cNvPr id="4" name="Picture 3">
             <a:extLst>
               <a:ext uri="{FF2B5EF4-FFF2-40B4-BE49-F238E27FC236}">
-                <a16:creationId xmlns:a16="http://schemas.microsoft.com/office/drawing/2014/main" id="{F8219F13-BAF0-C15F-3480-4085FDFAB680}"/>
+                <a16:creationId xmlns:a16="http://schemas.microsoft.com/office/drawing/2014/main" id="{81628D44-A494-38DC-1C0D-6D0CB008E8EE}"/>
+              </a:ext>
+            </a:extLst>
+          </p:cNvPr>
+          <p:cNvPicPr>
+            <a:picLocks noChangeAspect="1"/>
+          </p:cNvPicPr>
+          <p:nvPr/>
+        </p:nvPicPr>
+        <p:blipFill>
+          <a:blip r:embed="rId2">
+            <a:extLst>
+              <a:ext uri="{28A0092B-C50C-407E-A947-70E740481C1C}">
+                <a14:useLocalDpi xmlns:a14="http://schemas.microsoft.com/office/drawing/2010/main" val="0"/>
+              </a:ext>
+            </a:extLst>
+          </a:blip>
+          <a:stretch>
+            <a:fillRect/>
+          </a:stretch>
+        </p:blipFill>
+        <p:spPr>
+          <a:xfrm>
+            <a:off x="3255068" y="613577"/>
+            <a:ext cx="2449993" cy="2236243"/>
+          </a:xfrm>
+          <a:prstGeom prst="rect">
+            <a:avLst/>
+          </a:prstGeom>
+        </p:spPr>
+      </p:pic>
+      <p:pic>
+        <p:nvPicPr>
+          <p:cNvPr id="6" name="Picture 5">
+            <a:extLst>
+              <a:ext uri="{FF2B5EF4-FFF2-40B4-BE49-F238E27FC236}">
+                <a16:creationId xmlns:a16="http://schemas.microsoft.com/office/drawing/2014/main" id="{AB82B36A-0D4F-B353-6697-4CFEC5F5D19E}"/>
+              </a:ext>
+            </a:extLst>
+          </p:cNvPr>
+          <p:cNvPicPr>
+            <a:picLocks noChangeAspect="1"/>
+          </p:cNvPicPr>
+          <p:nvPr/>
+        </p:nvPicPr>
+        <p:blipFill>
+          <a:blip r:embed="rId3">
+            <a:extLst>
+              <a:ext uri="{28A0092B-C50C-407E-A947-70E740481C1C}">
+                <a14:useLocalDpi xmlns:a14="http://schemas.microsoft.com/office/drawing/2010/main" val="0"/>
+              </a:ext>
+            </a:extLst>
+          </a:blip>
+          <a:stretch>
+            <a:fillRect/>
+          </a:stretch>
+        </p:blipFill>
+        <p:spPr>
+          <a:xfrm>
+            <a:off x="5677710" y="47799"/>
+            <a:ext cx="3136031" cy="3281417"/>
+          </a:xfrm>
+          <a:prstGeom prst="rect">
+            <a:avLst/>
+          </a:prstGeom>
+        </p:spPr>
+      </p:pic>
+      <p:pic>
+        <p:nvPicPr>
+          <p:cNvPr id="9" name="Picture 8">
+            <a:extLst>
+              <a:ext uri="{FF2B5EF4-FFF2-40B4-BE49-F238E27FC236}">
+                <a16:creationId xmlns:a16="http://schemas.microsoft.com/office/drawing/2014/main" id="{A6409A48-B0E9-4417-CDE9-D25FF2D51EB1}"/>
+              </a:ext>
+            </a:extLst>
+          </p:cNvPr>
+          <p:cNvPicPr>
+            <a:picLocks noChangeAspect="1"/>
+          </p:cNvPicPr>
+          <p:nvPr/>
+        </p:nvPicPr>
+        <p:blipFill>
+          <a:blip r:embed="rId4">
+            <a:extLst>
+              <a:ext uri="{28A0092B-C50C-407E-A947-70E740481C1C}">
+                <a14:useLocalDpi xmlns:a14="http://schemas.microsoft.com/office/drawing/2010/main" val="0"/>
+              </a:ext>
+            </a:extLst>
+          </a:blip>
+          <a:stretch>
+            <a:fillRect/>
+          </a:stretch>
+        </p:blipFill>
+        <p:spPr>
+          <a:xfrm>
+            <a:off x="344598" y="811118"/>
+            <a:ext cx="1754781" cy="1754781"/>
+          </a:xfrm>
+          <a:prstGeom prst="rect">
+            <a:avLst/>
+          </a:prstGeom>
+        </p:spPr>
+      </p:pic>
+      <p:sp>
+        <p:nvSpPr>
+          <p:cNvPr id="10" name="Rectangle: Rounded Corners 9">
+            <a:extLst>
+              <a:ext uri="{FF2B5EF4-FFF2-40B4-BE49-F238E27FC236}">
+                <a16:creationId xmlns:a16="http://schemas.microsoft.com/office/drawing/2014/main" id="{40357FEF-427B-E8B7-41C4-025DF71B7BB6}"/>
               </a:ext>
             </a:extLst>
           </p:cNvPr>
@@ -4452,12 +4570,15 @@
         </p:nvSpPr>
         <p:spPr>
           <a:xfrm>
-            <a:off x="487017" y="417444"/>
-            <a:ext cx="10658061" cy="4015409"/>
-          </a:xfrm>
-          <a:prstGeom prst="rect">
+            <a:off x="148039" y="3239299"/>
+            <a:ext cx="2147900" cy="736067"/>
+          </a:xfrm>
+          <a:prstGeom prst="roundRect">
             <a:avLst/>
           </a:prstGeom>
+          <a:solidFill>
+            <a:schemeClr val="bg1"/>
+          </a:solidFill>
           <a:ln>
             <a:solidFill>
               <a:schemeClr val="bg1"/>
@@ -4465,13 +4586,13 @@
           </a:ln>
         </p:spPr>
         <p:style>
-          <a:lnRef idx="2">
+          <a:lnRef idx="1">
             <a:schemeClr val="dk1"/>
           </a:lnRef>
-          <a:fillRef idx="1">
-            <a:schemeClr val="lt1"/>
+          <a:fillRef idx="2">
+            <a:schemeClr val="dk1"/>
           </a:fillRef>
-          <a:effectRef idx="0">
+          <a:effectRef idx="1">
             <a:schemeClr val="dk1"/>
           </a:effectRef>
           <a:fontRef idx="minor">
@@ -4479,78 +4600,214 @@
           </a:fontRef>
         </p:style>
         <p:txBody>
-          <a:bodyPr rtlCol="0" anchor="t"/>
+          <a:bodyPr rtlCol="0" anchor="ctr"/>
           <a:lstStyle/>
           <a:p>
-            <a:pPr marL="285750" indent="-285750">
-              <a:buFont typeface="Arial" panose="020B0604020202020204" pitchFamily="34" charset="0"/>
-              <a:buChar char="•"/>
-            </a:pPr>
-            <a:r>
-              <a:rPr lang="en-US" sz="3000" dirty="0"/>
-              <a:t>Categorized products</a:t>
-            </a:r>
-          </a:p>
-          <a:p>
-            <a:pPr marL="285750" indent="-285750">
-              <a:buFont typeface="Arial" panose="020B0604020202020204" pitchFamily="34" charset="0"/>
-              <a:buChar char="•"/>
-            </a:pPr>
-            <a:endParaRPr lang="en-US" sz="3000" dirty="0"/>
-          </a:p>
-          <a:p>
-            <a:pPr marL="285750" indent="-285750">
-              <a:buFont typeface="Arial" panose="020B0604020202020204" pitchFamily="34" charset="0"/>
-              <a:buChar char="•"/>
-            </a:pPr>
-            <a:r>
-              <a:rPr lang="en-US" sz="3000" dirty="0"/>
-              <a:t>Specific Detailing of different categories</a:t>
-            </a:r>
-          </a:p>
-          <a:p>
-            <a:pPr marL="285750" indent="-285750">
-              <a:buFont typeface="Arial" panose="020B0604020202020204" pitchFamily="34" charset="0"/>
-              <a:buChar char="•"/>
-            </a:pPr>
-            <a:endParaRPr lang="en-US" sz="3000" dirty="0"/>
-          </a:p>
-          <a:p>
-            <a:pPr marL="285750" indent="-285750">
-              <a:buFont typeface="Arial" panose="020B0604020202020204" pitchFamily="34" charset="0"/>
-              <a:buChar char="•"/>
-            </a:pPr>
-            <a:r>
-              <a:rPr lang="en-US" sz="3000" dirty="0"/>
-              <a:t>Improved Search and Filter </a:t>
-            </a:r>
-          </a:p>
-          <a:p>
-            <a:endParaRPr lang="en-US" sz="3000" dirty="0"/>
-          </a:p>
-          <a:p>
-            <a:pPr marL="285750" indent="-285750">
-              <a:buFont typeface="Arial" panose="020B0604020202020204" pitchFamily="34" charset="0"/>
-              <a:buChar char="•"/>
-            </a:pPr>
-            <a:r>
-              <a:rPr lang="en-US" sz="3000" dirty="0"/>
-              <a:t>Messaging System</a:t>
-            </a:r>
-          </a:p>
-          <a:p>
-            <a:pPr marL="285750" indent="-285750">
-              <a:buFont typeface="Arial" panose="020B0604020202020204" pitchFamily="34" charset="0"/>
-              <a:buChar char="•"/>
-            </a:pPr>
-            <a:endParaRPr lang="en-US" sz="3000" dirty="0"/>
+            <a:pPr algn="ctr"/>
+            <a:r>
+              <a:rPr lang="en-US" sz="3200" dirty="0"/>
+              <a:t>Category</a:t>
+            </a:r>
+          </a:p>
+        </p:txBody>
+      </p:sp>
+      <p:sp>
+        <p:nvSpPr>
+          <p:cNvPr id="11" name="Rectangle: Rounded Corners 10">
+            <a:extLst>
+              <a:ext uri="{FF2B5EF4-FFF2-40B4-BE49-F238E27FC236}">
+                <a16:creationId xmlns:a16="http://schemas.microsoft.com/office/drawing/2014/main" id="{E9679CE5-BF21-60A9-B200-96A37666C41B}"/>
+              </a:ext>
+            </a:extLst>
+          </p:cNvPr>
+          <p:cNvSpPr/>
+          <p:nvPr/>
+        </p:nvSpPr>
+        <p:spPr>
+          <a:xfrm>
+            <a:off x="3156231" y="3239298"/>
+            <a:ext cx="2647666" cy="736067"/>
+          </a:xfrm>
+          <a:prstGeom prst="roundRect">
+            <a:avLst/>
+          </a:prstGeom>
+          <a:noFill/>
+          <a:ln>
+            <a:solidFill>
+              <a:schemeClr val="bg1"/>
+            </a:solidFill>
+          </a:ln>
+        </p:spPr>
+        <p:style>
+          <a:lnRef idx="1">
+            <a:schemeClr val="dk1"/>
+          </a:lnRef>
+          <a:fillRef idx="2">
+            <a:schemeClr val="dk1"/>
+          </a:fillRef>
+          <a:effectRef idx="1">
+            <a:schemeClr val="dk1"/>
+          </a:effectRef>
+          <a:fontRef idx="minor">
+            <a:schemeClr val="dk1"/>
+          </a:fontRef>
+        </p:style>
+        <p:txBody>
+          <a:bodyPr rtlCol="0" anchor="ctr"/>
+          <a:lstStyle/>
+          <a:p>
+            <a:pPr algn="ctr"/>
+            <a:r>
+              <a:rPr lang="en-US" sz="3200" dirty="0"/>
+              <a:t>Price-range</a:t>
+            </a:r>
+          </a:p>
+        </p:txBody>
+      </p:sp>
+      <p:sp>
+        <p:nvSpPr>
+          <p:cNvPr id="12" name="Rectangle: Rounded Corners 11">
+            <a:extLst>
+              <a:ext uri="{FF2B5EF4-FFF2-40B4-BE49-F238E27FC236}">
+                <a16:creationId xmlns:a16="http://schemas.microsoft.com/office/drawing/2014/main" id="{38FF0749-3EB6-AEC3-F560-1BF2E5EB9E6F}"/>
+              </a:ext>
+            </a:extLst>
+          </p:cNvPr>
+          <p:cNvSpPr/>
+          <p:nvPr/>
+        </p:nvSpPr>
+        <p:spPr>
+          <a:xfrm>
+            <a:off x="6152279" y="3239297"/>
+            <a:ext cx="2454964" cy="736067"/>
+          </a:xfrm>
+          <a:prstGeom prst="roundRect">
+            <a:avLst/>
+          </a:prstGeom>
+          <a:noFill/>
+          <a:ln>
+            <a:solidFill>
+              <a:schemeClr val="bg1"/>
+            </a:solidFill>
+          </a:ln>
+        </p:spPr>
+        <p:style>
+          <a:lnRef idx="1">
+            <a:schemeClr val="dk1"/>
+          </a:lnRef>
+          <a:fillRef idx="2">
+            <a:schemeClr val="dk1"/>
+          </a:fillRef>
+          <a:effectRef idx="1">
+            <a:schemeClr val="dk1"/>
+          </a:effectRef>
+          <a:fontRef idx="minor">
+            <a:schemeClr val="dk1"/>
+          </a:fontRef>
+        </p:style>
+        <p:txBody>
+          <a:bodyPr rtlCol="0" anchor="ctr"/>
+          <a:lstStyle/>
+          <a:p>
+            <a:pPr algn="ctr"/>
+            <a:r>
+              <a:rPr lang="en-US" sz="3200" dirty="0"/>
+              <a:t>Used-years</a:t>
+            </a:r>
+          </a:p>
+        </p:txBody>
+      </p:sp>
+      <p:pic>
+        <p:nvPicPr>
+          <p:cNvPr id="14" name="Picture 13">
+            <a:extLst>
+              <a:ext uri="{FF2B5EF4-FFF2-40B4-BE49-F238E27FC236}">
+                <a16:creationId xmlns:a16="http://schemas.microsoft.com/office/drawing/2014/main" id="{D77DD941-BB42-4209-3454-0C18181423B0}"/>
+              </a:ext>
+            </a:extLst>
+          </p:cNvPr>
+          <p:cNvPicPr>
+            <a:picLocks noChangeAspect="1"/>
+          </p:cNvPicPr>
+          <p:nvPr/>
+        </p:nvPicPr>
+        <p:blipFill>
+          <a:blip r:embed="rId5">
+            <a:extLst>
+              <a:ext uri="{28A0092B-C50C-407E-A947-70E740481C1C}">
+                <a14:useLocalDpi xmlns:a14="http://schemas.microsoft.com/office/drawing/2010/main" val="0"/>
+              </a:ext>
+            </a:extLst>
+          </a:blip>
+          <a:stretch>
+            <a:fillRect/>
+          </a:stretch>
+        </p:blipFill>
+        <p:spPr>
+          <a:xfrm>
+            <a:off x="9000140" y="500063"/>
+            <a:ext cx="2147899" cy="2147899"/>
+          </a:xfrm>
+          <a:prstGeom prst="rect">
+            <a:avLst/>
+          </a:prstGeom>
+        </p:spPr>
+      </p:pic>
+      <p:sp>
+        <p:nvSpPr>
+          <p:cNvPr id="15" name="Rectangle: Rounded Corners 14">
+            <a:extLst>
+              <a:ext uri="{FF2B5EF4-FFF2-40B4-BE49-F238E27FC236}">
+                <a16:creationId xmlns:a16="http://schemas.microsoft.com/office/drawing/2014/main" id="{EBA40BCA-8515-CF71-65A6-099BCCAF6807}"/>
+              </a:ext>
+            </a:extLst>
+          </p:cNvPr>
+          <p:cNvSpPr/>
+          <p:nvPr/>
+        </p:nvSpPr>
+        <p:spPr>
+          <a:xfrm>
+            <a:off x="8607243" y="3239297"/>
+            <a:ext cx="2841883" cy="736067"/>
+          </a:xfrm>
+          <a:prstGeom prst="roundRect">
+            <a:avLst/>
+          </a:prstGeom>
+          <a:noFill/>
+          <a:ln>
+            <a:noFill/>
+          </a:ln>
+        </p:spPr>
+        <p:style>
+          <a:lnRef idx="1">
+            <a:schemeClr val="dk1"/>
+          </a:lnRef>
+          <a:fillRef idx="2">
+            <a:schemeClr val="dk1"/>
+          </a:fillRef>
+          <a:effectRef idx="1">
+            <a:schemeClr val="dk1"/>
+          </a:effectRef>
+          <a:fontRef idx="minor">
+            <a:schemeClr val="dk1"/>
+          </a:fontRef>
+        </p:style>
+        <p:txBody>
+          <a:bodyPr rtlCol="0" anchor="ctr"/>
+          <a:lstStyle/>
+          <a:p>
+            <a:pPr algn="ctr"/>
+            <a:r>
+              <a:rPr lang="en-US" sz="3200" dirty="0"/>
+              <a:t>Geo-Location</a:t>
+            </a:r>
           </a:p>
         </p:txBody>
       </p:sp>
     </p:spTree>
     <p:extLst>
       <p:ext uri="{BB962C8B-B14F-4D97-AF65-F5344CB8AC3E}">
-        <p14:creationId xmlns:p14="http://schemas.microsoft.com/office/powerpoint/2010/main" val="1937748040"/>
+        <p14:creationId xmlns:p14="http://schemas.microsoft.com/office/powerpoint/2010/main" val="1737937361"/>
       </p:ext>
     </p:extLst>
   </p:cSld>
@@ -4606,18 +4863,48 @@
           <a:lstStyle/>
           <a:p>
             <a:r>
-              <a:rPr lang="en-US" sz="6600" b="1" dirty="0"/>
-              <a:t>Major Features</a:t>
-            </a:r>
-          </a:p>
-        </p:txBody>
-      </p:sp>
-      <p:sp>
-        <p:nvSpPr>
-          <p:cNvPr id="7" name="Rectangle 6">
+              <a:rPr lang="en-US" sz="4800" b="1" dirty="0"/>
+              <a:t>Ad Review</a:t>
+            </a:r>
+          </a:p>
+        </p:txBody>
+      </p:sp>
+      <p:pic>
+        <p:nvPicPr>
+          <p:cNvPr id="5" name="Picture 4">
             <a:extLst>
               <a:ext uri="{FF2B5EF4-FFF2-40B4-BE49-F238E27FC236}">
-                <a16:creationId xmlns:a16="http://schemas.microsoft.com/office/drawing/2014/main" id="{F8219F13-BAF0-C15F-3480-4085FDFAB680}"/>
+                <a16:creationId xmlns:a16="http://schemas.microsoft.com/office/drawing/2014/main" id="{C1930A06-E495-466A-E3D9-27DDB4B63795}"/>
+              </a:ext>
+            </a:extLst>
+          </p:cNvPr>
+          <p:cNvPicPr>
+            <a:picLocks noChangeAspect="1"/>
+          </p:cNvPicPr>
+          <p:nvPr/>
+        </p:nvPicPr>
+        <p:blipFill>
+          <a:blip r:embed="rId2"/>
+          <a:stretch>
+            <a:fillRect/>
+          </a:stretch>
+        </p:blipFill>
+        <p:spPr>
+          <a:xfrm>
+            <a:off x="1187045" y="0"/>
+            <a:ext cx="3673190" cy="4537512"/>
+          </a:xfrm>
+          <a:prstGeom prst="rect">
+            <a:avLst/>
+          </a:prstGeom>
+        </p:spPr>
+      </p:pic>
+      <p:sp>
+        <p:nvSpPr>
+          <p:cNvPr id="7" name="Rectangle: Rounded Corners 6">
+            <a:extLst>
+              <a:ext uri="{FF2B5EF4-FFF2-40B4-BE49-F238E27FC236}">
+                <a16:creationId xmlns:a16="http://schemas.microsoft.com/office/drawing/2014/main" id="{328E933F-9542-52EA-C7C0-CAA5B0C975C9}"/>
               </a:ext>
             </a:extLst>
           </p:cNvPr>
@@ -4626,12 +4913,15 @@
         </p:nvSpPr>
         <p:spPr>
           <a:xfrm>
-            <a:off x="496956" y="874643"/>
-            <a:ext cx="10658061" cy="3657600"/>
-          </a:xfrm>
-          <a:prstGeom prst="rect">
+            <a:off x="5370620" y="1432674"/>
+            <a:ext cx="4439302" cy="2179023"/>
+          </a:xfrm>
+          <a:prstGeom prst="roundRect">
             <a:avLst/>
           </a:prstGeom>
+          <a:solidFill>
+            <a:schemeClr val="bg1"/>
+          </a:solidFill>
           <a:ln>
             <a:solidFill>
               <a:schemeClr val="bg1"/>
@@ -4639,13 +4929,13 @@
           </a:ln>
         </p:spPr>
         <p:style>
-          <a:lnRef idx="2">
+          <a:lnRef idx="1">
             <a:schemeClr val="dk1"/>
           </a:lnRef>
-          <a:fillRef idx="1">
-            <a:schemeClr val="lt1"/>
+          <a:fillRef idx="2">
+            <a:schemeClr val="dk1"/>
           </a:fillRef>
-          <a:effectRef idx="0">
+          <a:effectRef idx="1">
             <a:schemeClr val="dk1"/>
           </a:effectRef>
           <a:fontRef idx="minor">
@@ -4653,82 +4943,21 @@
           </a:fontRef>
         </p:style>
         <p:txBody>
-          <a:bodyPr rtlCol="0" anchor="t"/>
+          <a:bodyPr rtlCol="0" anchor="ctr"/>
           <a:lstStyle/>
           <a:p>
-            <a:pPr marL="285750" indent="-285750">
-              <a:buFont typeface="Arial" panose="020B0604020202020204" pitchFamily="34" charset="0"/>
-              <a:buChar char="•"/>
-            </a:pPr>
-            <a:r>
-              <a:rPr lang="en-US" sz="3000" dirty="0"/>
-              <a:t>Offer and Negotiation system</a:t>
-            </a:r>
-          </a:p>
-          <a:p>
-            <a:pPr marL="285750" indent="-285750">
-              <a:buFont typeface="Arial" panose="020B0604020202020204" pitchFamily="34" charset="0"/>
-              <a:buChar char="•"/>
-            </a:pPr>
-            <a:endParaRPr lang="en-US" sz="3000" dirty="0"/>
-          </a:p>
-          <a:p>
-            <a:pPr marL="285750" indent="-285750">
-              <a:buFont typeface="Arial" panose="020B0604020202020204" pitchFamily="34" charset="0"/>
-              <a:buChar char="•"/>
-            </a:pPr>
-            <a:r>
-              <a:rPr lang="en-US" sz="3000" dirty="0"/>
-              <a:t>Promotion and Marketing</a:t>
-            </a:r>
-          </a:p>
-          <a:p>
-            <a:pPr marL="285750" indent="-285750">
-              <a:buFont typeface="Arial" panose="020B0604020202020204" pitchFamily="34" charset="0"/>
-              <a:buChar char="•"/>
-            </a:pPr>
-            <a:endParaRPr lang="en-US" sz="3000" dirty="0"/>
-          </a:p>
-          <a:p>
-            <a:pPr marL="285750" indent="-285750">
-              <a:buFont typeface="Arial" panose="020B0604020202020204" pitchFamily="34" charset="0"/>
-              <a:buChar char="•"/>
-            </a:pPr>
-            <a:r>
-              <a:rPr lang="en-US" sz="3000" dirty="0"/>
-              <a:t>Payment Integration</a:t>
-            </a:r>
-          </a:p>
-          <a:p>
-            <a:pPr marL="285750" indent="-285750">
-              <a:buFont typeface="Arial" panose="020B0604020202020204" pitchFamily="34" charset="0"/>
-              <a:buChar char="•"/>
-            </a:pPr>
-            <a:endParaRPr lang="en-US" sz="3000" dirty="0"/>
-          </a:p>
-          <a:p>
-            <a:pPr marL="285750" indent="-285750">
-              <a:buFont typeface="Arial" panose="020B0604020202020204" pitchFamily="34" charset="0"/>
-              <a:buChar char="•"/>
-            </a:pPr>
-            <a:r>
-              <a:rPr lang="en-US" sz="3000" dirty="0"/>
-              <a:t>Geo-location and distance based filter</a:t>
-            </a:r>
-          </a:p>
-          <a:p>
-            <a:pPr marL="285750" indent="-285750">
-              <a:buFont typeface="Arial" panose="020B0604020202020204" pitchFamily="34" charset="0"/>
-              <a:buChar char="•"/>
-            </a:pPr>
-            <a:endParaRPr lang="en-US" sz="3000" dirty="0"/>
+            <a:pPr algn="ctr"/>
+            <a:r>
+              <a:rPr lang="en-US" sz="4400" dirty="0"/>
+              <a:t>Prevent fraudulent ads</a:t>
+            </a:r>
           </a:p>
         </p:txBody>
       </p:sp>
     </p:spTree>
     <p:extLst>
       <p:ext uri="{BB962C8B-B14F-4D97-AF65-F5344CB8AC3E}">
-        <p14:creationId xmlns:p14="http://schemas.microsoft.com/office/powerpoint/2010/main" val="2068545355"/>
+        <p14:creationId xmlns:p14="http://schemas.microsoft.com/office/powerpoint/2010/main" val="1491157509"/>
       </p:ext>
     </p:extLst>
   </p:cSld>
@@ -4784,6 +5013,494 @@
           <a:lstStyle/>
           <a:p>
             <a:r>
+              <a:rPr lang="en-US" sz="4800" b="1" dirty="0"/>
+              <a:t>Messaging System</a:t>
+            </a:r>
+          </a:p>
+        </p:txBody>
+      </p:sp>
+      <p:pic>
+        <p:nvPicPr>
+          <p:cNvPr id="4" name="Picture 3">
+            <a:extLst>
+              <a:ext uri="{FF2B5EF4-FFF2-40B4-BE49-F238E27FC236}">
+                <a16:creationId xmlns:a16="http://schemas.microsoft.com/office/drawing/2014/main" id="{0590BB8C-9C31-2B93-1061-86A40C75B87F}"/>
+              </a:ext>
+            </a:extLst>
+          </p:cNvPr>
+          <p:cNvPicPr>
+            <a:picLocks noChangeAspect="1"/>
+          </p:cNvPicPr>
+          <p:nvPr/>
+        </p:nvPicPr>
+        <p:blipFill>
+          <a:blip r:embed="rId2">
+            <a:extLst>
+              <a:ext uri="{28A0092B-C50C-407E-A947-70E740481C1C}">
+                <a14:useLocalDpi xmlns:a14="http://schemas.microsoft.com/office/drawing/2010/main" val="0"/>
+              </a:ext>
+            </a:extLst>
+          </a:blip>
+          <a:stretch>
+            <a:fillRect/>
+          </a:stretch>
+        </p:blipFill>
+        <p:spPr>
+          <a:xfrm>
+            <a:off x="6569765" y="262651"/>
+            <a:ext cx="3319669" cy="3319669"/>
+          </a:xfrm>
+          <a:prstGeom prst="rect">
+            <a:avLst/>
+          </a:prstGeom>
+        </p:spPr>
+      </p:pic>
+      <p:pic>
+        <p:nvPicPr>
+          <p:cNvPr id="10" name="Picture 9">
+            <a:extLst>
+              <a:ext uri="{FF2B5EF4-FFF2-40B4-BE49-F238E27FC236}">
+                <a16:creationId xmlns:a16="http://schemas.microsoft.com/office/drawing/2014/main" id="{F8B6A8D5-B7DC-41D4-9070-991039953394}"/>
+              </a:ext>
+            </a:extLst>
+          </p:cNvPr>
+          <p:cNvPicPr>
+            <a:picLocks noChangeAspect="1"/>
+          </p:cNvPicPr>
+          <p:nvPr/>
+        </p:nvPicPr>
+        <p:blipFill>
+          <a:blip r:embed="rId3"/>
+          <a:stretch>
+            <a:fillRect/>
+          </a:stretch>
+        </p:blipFill>
+        <p:spPr>
+          <a:xfrm>
+            <a:off x="708992" y="119269"/>
+            <a:ext cx="3209022" cy="3463051"/>
+          </a:xfrm>
+          <a:prstGeom prst="rect">
+            <a:avLst/>
+          </a:prstGeom>
+        </p:spPr>
+      </p:pic>
+      <p:sp>
+        <p:nvSpPr>
+          <p:cNvPr id="11" name="Rectangle: Rounded Corners 10">
+            <a:extLst>
+              <a:ext uri="{FF2B5EF4-FFF2-40B4-BE49-F238E27FC236}">
+                <a16:creationId xmlns:a16="http://schemas.microsoft.com/office/drawing/2014/main" id="{5051EDA1-4388-6718-20CE-01C7DE644D06}"/>
+              </a:ext>
+            </a:extLst>
+          </p:cNvPr>
+          <p:cNvSpPr/>
+          <p:nvPr/>
+        </p:nvSpPr>
+        <p:spPr>
+          <a:xfrm>
+            <a:off x="708992" y="3847524"/>
+            <a:ext cx="3027946" cy="914401"/>
+          </a:xfrm>
+          <a:prstGeom prst="roundRect">
+            <a:avLst/>
+          </a:prstGeom>
+          <a:solidFill>
+            <a:schemeClr val="bg1"/>
+          </a:solidFill>
+          <a:ln>
+            <a:solidFill>
+              <a:schemeClr val="bg1"/>
+            </a:solidFill>
+          </a:ln>
+        </p:spPr>
+        <p:style>
+          <a:lnRef idx="1">
+            <a:schemeClr val="dk1"/>
+          </a:lnRef>
+          <a:fillRef idx="2">
+            <a:schemeClr val="dk1"/>
+          </a:fillRef>
+          <a:effectRef idx="1">
+            <a:schemeClr val="dk1"/>
+          </a:effectRef>
+          <a:fontRef idx="minor">
+            <a:schemeClr val="dk1"/>
+          </a:fontRef>
+        </p:style>
+        <p:txBody>
+          <a:bodyPr rtlCol="0" anchor="ctr"/>
+          <a:lstStyle/>
+          <a:p>
+            <a:pPr algn="ctr"/>
+            <a:r>
+              <a:rPr lang="en-US" sz="3600" dirty="0"/>
+              <a:t>Clarification</a:t>
+            </a:r>
+          </a:p>
+        </p:txBody>
+      </p:sp>
+      <p:sp>
+        <p:nvSpPr>
+          <p:cNvPr id="12" name="Rectangle: Rounded Corners 11">
+            <a:extLst>
+              <a:ext uri="{FF2B5EF4-FFF2-40B4-BE49-F238E27FC236}">
+                <a16:creationId xmlns:a16="http://schemas.microsoft.com/office/drawing/2014/main" id="{DCDF460A-311B-0A72-E194-BAEFCB1E8AC8}"/>
+              </a:ext>
+            </a:extLst>
+          </p:cNvPr>
+          <p:cNvSpPr/>
+          <p:nvPr/>
+        </p:nvSpPr>
+        <p:spPr>
+          <a:xfrm>
+            <a:off x="6861488" y="3772439"/>
+            <a:ext cx="3027946" cy="914401"/>
+          </a:xfrm>
+          <a:prstGeom prst="roundRect">
+            <a:avLst/>
+          </a:prstGeom>
+          <a:solidFill>
+            <a:schemeClr val="bg1"/>
+          </a:solidFill>
+          <a:ln>
+            <a:solidFill>
+              <a:schemeClr val="bg1"/>
+            </a:solidFill>
+          </a:ln>
+        </p:spPr>
+        <p:style>
+          <a:lnRef idx="1">
+            <a:schemeClr val="dk1"/>
+          </a:lnRef>
+          <a:fillRef idx="2">
+            <a:schemeClr val="dk1"/>
+          </a:fillRef>
+          <a:effectRef idx="1">
+            <a:schemeClr val="dk1"/>
+          </a:effectRef>
+          <a:fontRef idx="minor">
+            <a:schemeClr val="dk1"/>
+          </a:fontRef>
+        </p:style>
+        <p:txBody>
+          <a:bodyPr rtlCol="0" anchor="ctr"/>
+          <a:lstStyle/>
+          <a:p>
+            <a:pPr algn="ctr"/>
+            <a:r>
+              <a:rPr lang="en-US" sz="3600" dirty="0"/>
+              <a:t>Negotiation</a:t>
+            </a:r>
+          </a:p>
+        </p:txBody>
+      </p:sp>
+    </p:spTree>
+    <p:extLst>
+      <p:ext uri="{BB962C8B-B14F-4D97-AF65-F5344CB8AC3E}">
+        <p14:creationId xmlns:p14="http://schemas.microsoft.com/office/powerpoint/2010/main" val="1638719991"/>
+      </p:ext>
+    </p:extLst>
+  </p:cSld>
+  <p:clrMapOvr>
+    <a:masterClrMapping/>
+  </p:clrMapOvr>
+</p:sld>
+</file>
+
+<file path=ppt/slides/slide6.xml><?xml version="1.0" encoding="utf-8"?>
+<p:sld xmlns:a="http://schemas.openxmlformats.org/drawingml/2006/main" xmlns:r="http://schemas.openxmlformats.org/officeDocument/2006/relationships" xmlns:p="http://schemas.openxmlformats.org/presentationml/2006/main">
+  <p:cSld>
+    <p:spTree>
+      <p:nvGrpSpPr>
+        <p:cNvPr id="1" name=""/>
+        <p:cNvGrpSpPr/>
+        <p:nvPr/>
+      </p:nvGrpSpPr>
+      <p:grpSpPr>
+        <a:xfrm>
+          <a:off x="0" y="0"/>
+          <a:ext cx="0" cy="0"/>
+          <a:chOff x="0" y="0"/>
+          <a:chExt cx="0" cy="0"/>
+        </a:xfrm>
+      </p:grpSpPr>
+      <p:sp>
+        <p:nvSpPr>
+          <p:cNvPr id="2" name="Title 1">
+            <a:extLst>
+              <a:ext uri="{FF2B5EF4-FFF2-40B4-BE49-F238E27FC236}">
+                <a16:creationId xmlns:a16="http://schemas.microsoft.com/office/drawing/2014/main" id="{91979746-70A9-0E2A-45D6-46E10A9FE30B}"/>
+              </a:ext>
+            </a:extLst>
+          </p:cNvPr>
+          <p:cNvSpPr>
+            <a:spLocks noGrp="1"/>
+          </p:cNvSpPr>
+          <p:nvPr>
+            <p:ph type="title"/>
+          </p:nvPr>
+        </p:nvSpPr>
+        <p:spPr>
+          <a:xfrm>
+            <a:off x="805070" y="5526156"/>
+            <a:ext cx="9982200" cy="914400"/>
+          </a:xfrm>
+        </p:spPr>
+        <p:txBody>
+          <a:bodyPr>
+            <a:noAutofit/>
+          </a:bodyPr>
+          <a:lstStyle/>
+          <a:p>
+            <a:r>
+              <a:rPr lang="en-US" sz="4800" b="1" dirty="0"/>
+              <a:t>Promotion</a:t>
+            </a:r>
+          </a:p>
+        </p:txBody>
+      </p:sp>
+      <p:sp>
+        <p:nvSpPr>
+          <p:cNvPr id="11" name="Rectangle: Rounded Corners 10">
+            <a:extLst>
+              <a:ext uri="{FF2B5EF4-FFF2-40B4-BE49-F238E27FC236}">
+                <a16:creationId xmlns:a16="http://schemas.microsoft.com/office/drawing/2014/main" id="{5051EDA1-4388-6718-20CE-01C7DE644D06}"/>
+              </a:ext>
+            </a:extLst>
+          </p:cNvPr>
+          <p:cNvSpPr/>
+          <p:nvPr/>
+        </p:nvSpPr>
+        <p:spPr>
+          <a:xfrm>
+            <a:off x="702669" y="3766929"/>
+            <a:ext cx="3614530" cy="1311968"/>
+          </a:xfrm>
+          <a:prstGeom prst="roundRect">
+            <a:avLst/>
+          </a:prstGeom>
+          <a:solidFill>
+            <a:schemeClr val="bg1"/>
+          </a:solidFill>
+          <a:ln>
+            <a:solidFill>
+              <a:schemeClr val="bg1"/>
+            </a:solidFill>
+          </a:ln>
+        </p:spPr>
+        <p:style>
+          <a:lnRef idx="1">
+            <a:schemeClr val="dk1"/>
+          </a:lnRef>
+          <a:fillRef idx="2">
+            <a:schemeClr val="dk1"/>
+          </a:fillRef>
+          <a:effectRef idx="1">
+            <a:schemeClr val="dk1"/>
+          </a:effectRef>
+          <a:fontRef idx="minor">
+            <a:schemeClr val="dk1"/>
+          </a:fontRef>
+        </p:style>
+        <p:txBody>
+          <a:bodyPr rtlCol="0" anchor="ctr"/>
+          <a:lstStyle/>
+          <a:p>
+            <a:pPr algn="ctr"/>
+            <a:r>
+              <a:rPr lang="en-US" sz="4000" dirty="0"/>
+              <a:t>Featured Ads</a:t>
+            </a:r>
+          </a:p>
+        </p:txBody>
+      </p:sp>
+      <p:pic>
+        <p:nvPicPr>
+          <p:cNvPr id="5" name="Picture 4">
+            <a:extLst>
+              <a:ext uri="{FF2B5EF4-FFF2-40B4-BE49-F238E27FC236}">
+                <a16:creationId xmlns:a16="http://schemas.microsoft.com/office/drawing/2014/main" id="{CC595ADA-F68D-831C-8BF3-BA74A6533325}"/>
+              </a:ext>
+            </a:extLst>
+          </p:cNvPr>
+          <p:cNvPicPr>
+            <a:picLocks noChangeAspect="1"/>
+          </p:cNvPicPr>
+          <p:nvPr/>
+        </p:nvPicPr>
+        <p:blipFill>
+          <a:blip r:embed="rId2">
+            <a:extLst>
+              <a:ext uri="{28A0092B-C50C-407E-A947-70E740481C1C}">
+                <a14:useLocalDpi xmlns:a14="http://schemas.microsoft.com/office/drawing/2010/main" val="0"/>
+              </a:ext>
+            </a:extLst>
+          </a:blip>
+          <a:stretch>
+            <a:fillRect/>
+          </a:stretch>
+        </p:blipFill>
+        <p:spPr>
+          <a:xfrm>
+            <a:off x="1050539" y="122579"/>
+            <a:ext cx="3521461" cy="3521461"/>
+          </a:xfrm>
+          <a:prstGeom prst="rect">
+            <a:avLst/>
+          </a:prstGeom>
+        </p:spPr>
+      </p:pic>
+      <p:pic>
+        <p:nvPicPr>
+          <p:cNvPr id="7" name="Picture 6">
+            <a:extLst>
+              <a:ext uri="{FF2B5EF4-FFF2-40B4-BE49-F238E27FC236}">
+                <a16:creationId xmlns:a16="http://schemas.microsoft.com/office/drawing/2014/main" id="{7B122133-0D10-05C8-3891-B446637D5EBA}"/>
+              </a:ext>
+            </a:extLst>
+          </p:cNvPr>
+          <p:cNvPicPr>
+            <a:picLocks noChangeAspect="1"/>
+          </p:cNvPicPr>
+          <p:nvPr/>
+        </p:nvPicPr>
+        <p:blipFill>
+          <a:blip r:embed="rId3">
+            <a:extLst>
+              <a:ext uri="{28A0092B-C50C-407E-A947-70E740481C1C}">
+                <a14:useLocalDpi xmlns:a14="http://schemas.microsoft.com/office/drawing/2010/main" val="0"/>
+              </a:ext>
+            </a:extLst>
+          </a:blip>
+          <a:stretch>
+            <a:fillRect/>
+          </a:stretch>
+        </p:blipFill>
+        <p:spPr>
+          <a:xfrm>
+            <a:off x="7019663" y="192001"/>
+            <a:ext cx="3237520" cy="3237520"/>
+          </a:xfrm>
+          <a:prstGeom prst="rect">
+            <a:avLst/>
+          </a:prstGeom>
+        </p:spPr>
+      </p:pic>
+      <p:sp>
+        <p:nvSpPr>
+          <p:cNvPr id="8" name="Rectangle: Rounded Corners 7">
+            <a:extLst>
+              <a:ext uri="{FF2B5EF4-FFF2-40B4-BE49-F238E27FC236}">
+                <a16:creationId xmlns:a16="http://schemas.microsoft.com/office/drawing/2014/main" id="{1206FBB5-76C2-7BF7-977F-166A3BBF67A6}"/>
+              </a:ext>
+            </a:extLst>
+          </p:cNvPr>
+          <p:cNvSpPr/>
+          <p:nvPr/>
+        </p:nvSpPr>
+        <p:spPr>
+          <a:xfrm>
+            <a:off x="5975075" y="3644040"/>
+            <a:ext cx="5256143" cy="1311968"/>
+          </a:xfrm>
+          <a:prstGeom prst="roundRect">
+            <a:avLst/>
+          </a:prstGeom>
+          <a:solidFill>
+            <a:schemeClr val="bg1"/>
+          </a:solidFill>
+          <a:ln>
+            <a:solidFill>
+              <a:schemeClr val="bg1"/>
+            </a:solidFill>
+          </a:ln>
+        </p:spPr>
+        <p:style>
+          <a:lnRef idx="1">
+            <a:schemeClr val="dk1"/>
+          </a:lnRef>
+          <a:fillRef idx="2">
+            <a:schemeClr val="dk1"/>
+          </a:fillRef>
+          <a:effectRef idx="1">
+            <a:schemeClr val="dk1"/>
+          </a:effectRef>
+          <a:fontRef idx="minor">
+            <a:schemeClr val="dk1"/>
+          </a:fontRef>
+        </p:style>
+        <p:txBody>
+          <a:bodyPr rtlCol="0" anchor="ctr"/>
+          <a:lstStyle/>
+          <a:p>
+            <a:pPr algn="ctr"/>
+            <a:r>
+              <a:rPr lang="en-US" sz="4000" dirty="0"/>
+              <a:t>Payment Integration</a:t>
+            </a:r>
+          </a:p>
+        </p:txBody>
+      </p:sp>
+    </p:spTree>
+    <p:extLst>
+      <p:ext uri="{BB962C8B-B14F-4D97-AF65-F5344CB8AC3E}">
+        <p14:creationId xmlns:p14="http://schemas.microsoft.com/office/powerpoint/2010/main" val="2237525805"/>
+      </p:ext>
+    </p:extLst>
+  </p:cSld>
+  <p:clrMapOvr>
+    <a:masterClrMapping/>
+  </p:clrMapOvr>
+</p:sld>
+</file>
+
+<file path=ppt/slides/slide7.xml><?xml version="1.0" encoding="utf-8"?>
+<p:sld xmlns:a="http://schemas.openxmlformats.org/drawingml/2006/main" xmlns:r="http://schemas.openxmlformats.org/officeDocument/2006/relationships" xmlns:p="http://schemas.openxmlformats.org/presentationml/2006/main">
+  <p:cSld>
+    <p:spTree>
+      <p:nvGrpSpPr>
+        <p:cNvPr id="1" name=""/>
+        <p:cNvGrpSpPr/>
+        <p:nvPr/>
+      </p:nvGrpSpPr>
+      <p:grpSpPr>
+        <a:xfrm>
+          <a:off x="0" y="0"/>
+          <a:ext cx="0" cy="0"/>
+          <a:chOff x="0" y="0"/>
+          <a:chExt cx="0" cy="0"/>
+        </a:xfrm>
+      </p:grpSpPr>
+      <p:sp>
+        <p:nvSpPr>
+          <p:cNvPr id="2" name="Title 1">
+            <a:extLst>
+              <a:ext uri="{FF2B5EF4-FFF2-40B4-BE49-F238E27FC236}">
+                <a16:creationId xmlns:a16="http://schemas.microsoft.com/office/drawing/2014/main" id="{91979746-70A9-0E2A-45D6-46E10A9FE30B}"/>
+              </a:ext>
+            </a:extLst>
+          </p:cNvPr>
+          <p:cNvSpPr>
+            <a:spLocks noGrp="1"/>
+          </p:cNvSpPr>
+          <p:nvPr>
+            <p:ph type="title"/>
+          </p:nvPr>
+        </p:nvSpPr>
+        <p:spPr>
+          <a:xfrm>
+            <a:off x="805070" y="5526156"/>
+            <a:ext cx="9982200" cy="914400"/>
+          </a:xfrm>
+        </p:spPr>
+        <p:txBody>
+          <a:bodyPr>
+            <a:noAutofit/>
+          </a:bodyPr>
+          <a:lstStyle/>
+          <a:p>
+            <a:r>
               <a:rPr lang="en-US" sz="6600" b="1" dirty="0"/>
               <a:t>Tech Stack</a:t>
             </a:r>
@@ -4865,13 +5582,8 @@
             </a:r>
             <a:r>
               <a:rPr lang="en-US" sz="3000" dirty="0"/>
-              <a:t> : NodeJS and </a:t>
-            </a:r>
-            <a:r>
-              <a:rPr lang="en-US" sz="3000" dirty="0" err="1"/>
-              <a:t>ExpressJS</a:t>
-            </a:r>
-            <a:endParaRPr lang="en-US" sz="3000" dirty="0"/>
+              <a:t> : NodeJS and ExpressJS</a:t>
+            </a:r>
           </a:p>
           <a:p>
             <a:pPr marL="285750" indent="-285750">

</xml_diff>